<commit_message>
feat: working answered / unanswered question page
</commit_message>
<xml_diff>
--- a/Udacity Would You Rather Storyboard.pptx
+++ b/Udacity Would You Rather Storyboard.pptx
@@ -105,11 +105,6 @@
       </a:defRPr>
     </a:lvl9pPr>
   </p:defaultTextStyle>
-  <p:extLst>
-    <p:ext uri="{EFAFB233-063F-42B5-8137-9DF3F51BA10A}">
-      <p15:sldGuideLst xmlns:p15="http://schemas.microsoft.com/office/powerpoint/2012/main"/>
-    </p:ext>
-  </p:extLst>
 </p:presentation>
 </file>
 
@@ -155,9 +150,10 @@
           </a:lstStyle>
           <a:p>
             <a:r>
-              <a:rPr lang="en-US"/>
+              <a:rPr lang="en-US" smtClean="0"/>
               <a:t>Click to edit Master title style</a:t>
             </a:r>
+            <a:endParaRPr lang="en-US"/>
           </a:p>
         </p:txBody>
       </p:sp>
@@ -219,9 +215,10 @@
           </a:lstStyle>
           <a:p>
             <a:r>
-              <a:rPr lang="en-US"/>
+              <a:rPr lang="en-US" smtClean="0"/>
               <a:t>Click to edit Master subtitle style</a:t>
             </a:r>
+            <a:endParaRPr lang="en-US"/>
           </a:p>
         </p:txBody>
       </p:sp>
@@ -242,7 +239,7 @@
           <a:p>
             <a:fld id="{EC415814-B94C-473C-AF69-EEF9B37A2DCE}" type="datetimeFigureOut">
               <a:rPr lang="en-US" smtClean="0"/>
-              <a:t>8/24/2018</a:t>
+              <a:t>7/29/2018</a:t>
             </a:fld>
             <a:endParaRPr lang="en-US"/>
           </a:p>
@@ -336,9 +333,10 @@
           <a:lstStyle/>
           <a:p>
             <a:r>
-              <a:rPr lang="en-US"/>
+              <a:rPr lang="en-US" smtClean="0"/>
               <a:t>Click to edit Master title style</a:t>
             </a:r>
+            <a:endParaRPr lang="en-US"/>
           </a:p>
         </p:txBody>
       </p:sp>
@@ -359,37 +357,38 @@
           <a:p>
             <a:pPr lvl="0"/>
             <a:r>
-              <a:rPr lang="en-US"/>
+              <a:rPr lang="en-US" smtClean="0"/>
               <a:t>Edit Master text styles</a:t>
             </a:r>
           </a:p>
           <a:p>
             <a:pPr lvl="1"/>
             <a:r>
-              <a:rPr lang="en-US"/>
+              <a:rPr lang="en-US" smtClean="0"/>
               <a:t>Second level</a:t>
             </a:r>
           </a:p>
           <a:p>
             <a:pPr lvl="2"/>
             <a:r>
-              <a:rPr lang="en-US"/>
+              <a:rPr lang="en-US" smtClean="0"/>
               <a:t>Third level</a:t>
             </a:r>
           </a:p>
           <a:p>
             <a:pPr lvl="3"/>
             <a:r>
-              <a:rPr lang="en-US"/>
+              <a:rPr lang="en-US" smtClean="0"/>
               <a:t>Fourth level</a:t>
             </a:r>
           </a:p>
           <a:p>
             <a:pPr lvl="4"/>
             <a:r>
-              <a:rPr lang="en-US"/>
+              <a:rPr lang="en-US" smtClean="0"/>
               <a:t>Fifth level</a:t>
             </a:r>
+            <a:endParaRPr lang="en-US"/>
           </a:p>
         </p:txBody>
       </p:sp>
@@ -410,7 +409,7 @@
           <a:p>
             <a:fld id="{EC415814-B94C-473C-AF69-EEF9B37A2DCE}" type="datetimeFigureOut">
               <a:rPr lang="en-US" smtClean="0"/>
-              <a:t>8/24/2018</a:t>
+              <a:t>7/29/2018</a:t>
             </a:fld>
             <a:endParaRPr lang="en-US"/>
           </a:p>
@@ -509,9 +508,10 @@
           <a:lstStyle/>
           <a:p>
             <a:r>
-              <a:rPr lang="en-US"/>
+              <a:rPr lang="en-US" smtClean="0"/>
               <a:t>Click to edit Master title style</a:t>
             </a:r>
+            <a:endParaRPr lang="en-US"/>
           </a:p>
         </p:txBody>
       </p:sp>
@@ -537,37 +537,38 @@
           <a:p>
             <a:pPr lvl="0"/>
             <a:r>
-              <a:rPr lang="en-US"/>
+              <a:rPr lang="en-US" smtClean="0"/>
               <a:t>Edit Master text styles</a:t>
             </a:r>
           </a:p>
           <a:p>
             <a:pPr lvl="1"/>
             <a:r>
-              <a:rPr lang="en-US"/>
+              <a:rPr lang="en-US" smtClean="0"/>
               <a:t>Second level</a:t>
             </a:r>
           </a:p>
           <a:p>
             <a:pPr lvl="2"/>
             <a:r>
-              <a:rPr lang="en-US"/>
+              <a:rPr lang="en-US" smtClean="0"/>
               <a:t>Third level</a:t>
             </a:r>
           </a:p>
           <a:p>
             <a:pPr lvl="3"/>
             <a:r>
-              <a:rPr lang="en-US"/>
+              <a:rPr lang="en-US" smtClean="0"/>
               <a:t>Fourth level</a:t>
             </a:r>
           </a:p>
           <a:p>
             <a:pPr lvl="4"/>
             <a:r>
-              <a:rPr lang="en-US"/>
+              <a:rPr lang="en-US" smtClean="0"/>
               <a:t>Fifth level</a:t>
             </a:r>
+            <a:endParaRPr lang="en-US"/>
           </a:p>
         </p:txBody>
       </p:sp>
@@ -588,7 +589,7 @@
           <a:p>
             <a:fld id="{EC415814-B94C-473C-AF69-EEF9B37A2DCE}" type="datetimeFigureOut">
               <a:rPr lang="en-US" smtClean="0"/>
-              <a:t>8/24/2018</a:t>
+              <a:t>7/29/2018</a:t>
             </a:fld>
             <a:endParaRPr lang="en-US"/>
           </a:p>
@@ -682,9 +683,10 @@
           <a:lstStyle/>
           <a:p>
             <a:r>
-              <a:rPr lang="en-US"/>
+              <a:rPr lang="en-US" smtClean="0"/>
               <a:t>Click to edit Master title style</a:t>
             </a:r>
+            <a:endParaRPr lang="en-US"/>
           </a:p>
         </p:txBody>
       </p:sp>
@@ -705,37 +707,38 @@
           <a:p>
             <a:pPr lvl="0"/>
             <a:r>
-              <a:rPr lang="en-US"/>
+              <a:rPr lang="en-US" smtClean="0"/>
               <a:t>Edit Master text styles</a:t>
             </a:r>
           </a:p>
           <a:p>
             <a:pPr lvl="1"/>
             <a:r>
-              <a:rPr lang="en-US"/>
+              <a:rPr lang="en-US" smtClean="0"/>
               <a:t>Second level</a:t>
             </a:r>
           </a:p>
           <a:p>
             <a:pPr lvl="2"/>
             <a:r>
-              <a:rPr lang="en-US"/>
+              <a:rPr lang="en-US" smtClean="0"/>
               <a:t>Third level</a:t>
             </a:r>
           </a:p>
           <a:p>
             <a:pPr lvl="3"/>
             <a:r>
-              <a:rPr lang="en-US"/>
+              <a:rPr lang="en-US" smtClean="0"/>
               <a:t>Fourth level</a:t>
             </a:r>
           </a:p>
           <a:p>
             <a:pPr lvl="4"/>
             <a:r>
-              <a:rPr lang="en-US"/>
+              <a:rPr lang="en-US" smtClean="0"/>
               <a:t>Fifth level</a:t>
             </a:r>
+            <a:endParaRPr lang="en-US"/>
           </a:p>
         </p:txBody>
       </p:sp>
@@ -756,7 +759,7 @@
           <a:p>
             <a:fld id="{EC415814-B94C-473C-AF69-EEF9B37A2DCE}" type="datetimeFigureOut">
               <a:rPr lang="en-US" smtClean="0"/>
-              <a:t>8/24/2018</a:t>
+              <a:t>7/29/2018</a:t>
             </a:fld>
             <a:endParaRPr lang="en-US"/>
           </a:p>
@@ -859,9 +862,10 @@
           </a:lstStyle>
           <a:p>
             <a:r>
-              <a:rPr lang="en-US"/>
+              <a:rPr lang="en-US" smtClean="0"/>
               <a:t>Click to edit Master title style</a:t>
             </a:r>
+            <a:endParaRPr lang="en-US"/>
           </a:p>
         </p:txBody>
       </p:sp>
@@ -978,7 +982,7 @@
           <a:p>
             <a:pPr lvl="0"/>
             <a:r>
-              <a:rPr lang="en-US"/>
+              <a:rPr lang="en-US" smtClean="0"/>
               <a:t>Edit Master text styles</a:t>
             </a:r>
           </a:p>
@@ -1001,7 +1005,7 @@
           <a:p>
             <a:fld id="{EC415814-B94C-473C-AF69-EEF9B37A2DCE}" type="datetimeFigureOut">
               <a:rPr lang="en-US" smtClean="0"/>
-              <a:t>8/24/2018</a:t>
+              <a:t>7/29/2018</a:t>
             </a:fld>
             <a:endParaRPr lang="en-US"/>
           </a:p>
@@ -1095,9 +1099,10 @@
           <a:lstStyle/>
           <a:p>
             <a:r>
-              <a:rPr lang="en-US"/>
+              <a:rPr lang="en-US" smtClean="0"/>
               <a:t>Click to edit Master title style</a:t>
             </a:r>
+            <a:endParaRPr lang="en-US"/>
           </a:p>
         </p:txBody>
       </p:sp>
@@ -1123,37 +1128,38 @@
           <a:p>
             <a:pPr lvl="0"/>
             <a:r>
-              <a:rPr lang="en-US"/>
+              <a:rPr lang="en-US" smtClean="0"/>
               <a:t>Edit Master text styles</a:t>
             </a:r>
           </a:p>
           <a:p>
             <a:pPr lvl="1"/>
             <a:r>
-              <a:rPr lang="en-US"/>
+              <a:rPr lang="en-US" smtClean="0"/>
               <a:t>Second level</a:t>
             </a:r>
           </a:p>
           <a:p>
             <a:pPr lvl="2"/>
             <a:r>
-              <a:rPr lang="en-US"/>
+              <a:rPr lang="en-US" smtClean="0"/>
               <a:t>Third level</a:t>
             </a:r>
           </a:p>
           <a:p>
             <a:pPr lvl="3"/>
             <a:r>
-              <a:rPr lang="en-US"/>
+              <a:rPr lang="en-US" smtClean="0"/>
               <a:t>Fourth level</a:t>
             </a:r>
           </a:p>
           <a:p>
             <a:pPr lvl="4"/>
             <a:r>
-              <a:rPr lang="en-US"/>
+              <a:rPr lang="en-US" smtClean="0"/>
               <a:t>Fifth level</a:t>
             </a:r>
+            <a:endParaRPr lang="en-US"/>
           </a:p>
         </p:txBody>
       </p:sp>
@@ -1179,37 +1185,38 @@
           <a:p>
             <a:pPr lvl="0"/>
             <a:r>
-              <a:rPr lang="en-US"/>
+              <a:rPr lang="en-US" smtClean="0"/>
               <a:t>Edit Master text styles</a:t>
             </a:r>
           </a:p>
           <a:p>
             <a:pPr lvl="1"/>
             <a:r>
-              <a:rPr lang="en-US"/>
+              <a:rPr lang="en-US" smtClean="0"/>
               <a:t>Second level</a:t>
             </a:r>
           </a:p>
           <a:p>
             <a:pPr lvl="2"/>
             <a:r>
-              <a:rPr lang="en-US"/>
+              <a:rPr lang="en-US" smtClean="0"/>
               <a:t>Third level</a:t>
             </a:r>
           </a:p>
           <a:p>
             <a:pPr lvl="3"/>
             <a:r>
-              <a:rPr lang="en-US"/>
+              <a:rPr lang="en-US" smtClean="0"/>
               <a:t>Fourth level</a:t>
             </a:r>
           </a:p>
           <a:p>
             <a:pPr lvl="4"/>
             <a:r>
-              <a:rPr lang="en-US"/>
+              <a:rPr lang="en-US" smtClean="0"/>
               <a:t>Fifth level</a:t>
             </a:r>
+            <a:endParaRPr lang="en-US"/>
           </a:p>
         </p:txBody>
       </p:sp>
@@ -1230,7 +1237,7 @@
           <a:p>
             <a:fld id="{EC415814-B94C-473C-AF69-EEF9B37A2DCE}" type="datetimeFigureOut">
               <a:rPr lang="en-US" smtClean="0"/>
-              <a:t>8/24/2018</a:t>
+              <a:t>7/29/2018</a:t>
             </a:fld>
             <a:endParaRPr lang="en-US"/>
           </a:p>
@@ -1329,9 +1336,10 @@
           <a:lstStyle/>
           <a:p>
             <a:r>
-              <a:rPr lang="en-US"/>
+              <a:rPr lang="en-US" smtClean="0"/>
               <a:t>Click to edit Master title style</a:t>
             </a:r>
+            <a:endParaRPr lang="en-US"/>
           </a:p>
         </p:txBody>
       </p:sp>
@@ -1394,7 +1402,7 @@
           <a:p>
             <a:pPr lvl="0"/>
             <a:r>
-              <a:rPr lang="en-US"/>
+              <a:rPr lang="en-US" smtClean="0"/>
               <a:t>Edit Master text styles</a:t>
             </a:r>
           </a:p>
@@ -1422,37 +1430,38 @@
           <a:p>
             <a:pPr lvl="0"/>
             <a:r>
-              <a:rPr lang="en-US"/>
+              <a:rPr lang="en-US" smtClean="0"/>
               <a:t>Edit Master text styles</a:t>
             </a:r>
           </a:p>
           <a:p>
             <a:pPr lvl="1"/>
             <a:r>
-              <a:rPr lang="en-US"/>
+              <a:rPr lang="en-US" smtClean="0"/>
               <a:t>Second level</a:t>
             </a:r>
           </a:p>
           <a:p>
             <a:pPr lvl="2"/>
             <a:r>
-              <a:rPr lang="en-US"/>
+              <a:rPr lang="en-US" smtClean="0"/>
               <a:t>Third level</a:t>
             </a:r>
           </a:p>
           <a:p>
             <a:pPr lvl="3"/>
             <a:r>
-              <a:rPr lang="en-US"/>
+              <a:rPr lang="en-US" smtClean="0"/>
               <a:t>Fourth level</a:t>
             </a:r>
           </a:p>
           <a:p>
             <a:pPr lvl="4"/>
             <a:r>
-              <a:rPr lang="en-US"/>
+              <a:rPr lang="en-US" smtClean="0"/>
               <a:t>Fifth level</a:t>
             </a:r>
+            <a:endParaRPr lang="en-US"/>
           </a:p>
         </p:txBody>
       </p:sp>
@@ -1515,7 +1524,7 @@
           <a:p>
             <a:pPr lvl="0"/>
             <a:r>
-              <a:rPr lang="en-US"/>
+              <a:rPr lang="en-US" smtClean="0"/>
               <a:t>Edit Master text styles</a:t>
             </a:r>
           </a:p>
@@ -1543,37 +1552,38 @@
           <a:p>
             <a:pPr lvl="0"/>
             <a:r>
-              <a:rPr lang="en-US"/>
+              <a:rPr lang="en-US" smtClean="0"/>
               <a:t>Edit Master text styles</a:t>
             </a:r>
           </a:p>
           <a:p>
             <a:pPr lvl="1"/>
             <a:r>
-              <a:rPr lang="en-US"/>
+              <a:rPr lang="en-US" smtClean="0"/>
               <a:t>Second level</a:t>
             </a:r>
           </a:p>
           <a:p>
             <a:pPr lvl="2"/>
             <a:r>
-              <a:rPr lang="en-US"/>
+              <a:rPr lang="en-US" smtClean="0"/>
               <a:t>Third level</a:t>
             </a:r>
           </a:p>
           <a:p>
             <a:pPr lvl="3"/>
             <a:r>
-              <a:rPr lang="en-US"/>
+              <a:rPr lang="en-US" smtClean="0"/>
               <a:t>Fourth level</a:t>
             </a:r>
           </a:p>
           <a:p>
             <a:pPr lvl="4"/>
             <a:r>
-              <a:rPr lang="en-US"/>
+              <a:rPr lang="en-US" smtClean="0"/>
               <a:t>Fifth level</a:t>
             </a:r>
+            <a:endParaRPr lang="en-US"/>
           </a:p>
         </p:txBody>
       </p:sp>
@@ -1594,7 +1604,7 @@
           <a:p>
             <a:fld id="{EC415814-B94C-473C-AF69-EEF9B37A2DCE}" type="datetimeFigureOut">
               <a:rPr lang="en-US" smtClean="0"/>
-              <a:t>8/24/2018</a:t>
+              <a:t>7/29/2018</a:t>
             </a:fld>
             <a:endParaRPr lang="en-US"/>
           </a:p>
@@ -1688,9 +1698,10 @@
           <a:lstStyle/>
           <a:p>
             <a:r>
-              <a:rPr lang="en-US"/>
+              <a:rPr lang="en-US" smtClean="0"/>
               <a:t>Click to edit Master title style</a:t>
             </a:r>
+            <a:endParaRPr lang="en-US"/>
           </a:p>
         </p:txBody>
       </p:sp>
@@ -1711,7 +1722,7 @@
           <a:p>
             <a:fld id="{EC415814-B94C-473C-AF69-EEF9B37A2DCE}" type="datetimeFigureOut">
               <a:rPr lang="en-US" smtClean="0"/>
-              <a:t>8/24/2018</a:t>
+              <a:t>7/29/2018</a:t>
             </a:fld>
             <a:endParaRPr lang="en-US"/>
           </a:p>
@@ -1806,7 +1817,7 @@
           <a:p>
             <a:fld id="{EC415814-B94C-473C-AF69-EEF9B37A2DCE}" type="datetimeFigureOut">
               <a:rPr lang="en-US" smtClean="0"/>
-              <a:t>8/24/2018</a:t>
+              <a:t>7/29/2018</a:t>
             </a:fld>
             <a:endParaRPr lang="en-US"/>
           </a:p>
@@ -1909,9 +1920,10 @@
           </a:lstStyle>
           <a:p>
             <a:r>
-              <a:rPr lang="en-US"/>
+              <a:rPr lang="en-US" smtClean="0"/>
               <a:t>Click to edit Master title style</a:t>
             </a:r>
+            <a:endParaRPr lang="en-US"/>
           </a:p>
         </p:txBody>
       </p:sp>
@@ -1965,37 +1977,38 @@
           <a:p>
             <a:pPr lvl="0"/>
             <a:r>
-              <a:rPr lang="en-US"/>
+              <a:rPr lang="en-US" smtClean="0"/>
               <a:t>Edit Master text styles</a:t>
             </a:r>
           </a:p>
           <a:p>
             <a:pPr lvl="1"/>
             <a:r>
-              <a:rPr lang="en-US"/>
+              <a:rPr lang="en-US" smtClean="0"/>
               <a:t>Second level</a:t>
             </a:r>
           </a:p>
           <a:p>
             <a:pPr lvl="2"/>
             <a:r>
-              <a:rPr lang="en-US"/>
+              <a:rPr lang="en-US" smtClean="0"/>
               <a:t>Third level</a:t>
             </a:r>
           </a:p>
           <a:p>
             <a:pPr lvl="3"/>
             <a:r>
-              <a:rPr lang="en-US"/>
+              <a:rPr lang="en-US" smtClean="0"/>
               <a:t>Fourth level</a:t>
             </a:r>
           </a:p>
           <a:p>
             <a:pPr lvl="4"/>
             <a:r>
-              <a:rPr lang="en-US"/>
+              <a:rPr lang="en-US" smtClean="0"/>
               <a:t>Fifth level</a:t>
             </a:r>
+            <a:endParaRPr lang="en-US"/>
           </a:p>
         </p:txBody>
       </p:sp>
@@ -2058,7 +2071,7 @@
           <a:p>
             <a:pPr lvl="0"/>
             <a:r>
-              <a:rPr lang="en-US"/>
+              <a:rPr lang="en-US" smtClean="0"/>
               <a:t>Edit Master text styles</a:t>
             </a:r>
           </a:p>
@@ -2081,7 +2094,7 @@
           <a:p>
             <a:fld id="{EC415814-B94C-473C-AF69-EEF9B37A2DCE}" type="datetimeFigureOut">
               <a:rPr lang="en-US" smtClean="0"/>
-              <a:t>8/24/2018</a:t>
+              <a:t>7/29/2018</a:t>
             </a:fld>
             <a:endParaRPr lang="en-US"/>
           </a:p>
@@ -2184,9 +2197,10 @@
           </a:lstStyle>
           <a:p>
             <a:r>
-              <a:rPr lang="en-US"/>
+              <a:rPr lang="en-US" smtClean="0"/>
               <a:t>Click to edit Master title style</a:t>
             </a:r>
+            <a:endParaRPr lang="en-US"/>
           </a:p>
         </p:txBody>
       </p:sp>
@@ -2310,7 +2324,7 @@
           <a:p>
             <a:pPr lvl="0"/>
             <a:r>
-              <a:rPr lang="en-US"/>
+              <a:rPr lang="en-US" smtClean="0"/>
               <a:t>Edit Master text styles</a:t>
             </a:r>
           </a:p>
@@ -2333,7 +2347,7 @@
           <a:p>
             <a:fld id="{EC415814-B94C-473C-AF69-EEF9B37A2DCE}" type="datetimeFigureOut">
               <a:rPr lang="en-US" smtClean="0"/>
-              <a:t>8/24/2018</a:t>
+              <a:t>7/29/2018</a:t>
             </a:fld>
             <a:endParaRPr lang="en-US"/>
           </a:p>
@@ -2442,9 +2456,10 @@
           <a:lstStyle/>
           <a:p>
             <a:r>
-              <a:rPr lang="en-US"/>
+              <a:rPr lang="en-US" smtClean="0"/>
               <a:t>Click to edit Master title style</a:t>
             </a:r>
+            <a:endParaRPr lang="en-US"/>
           </a:p>
         </p:txBody>
       </p:sp>
@@ -2475,37 +2490,38 @@
           <a:p>
             <a:pPr lvl="0"/>
             <a:r>
-              <a:rPr lang="en-US"/>
+              <a:rPr lang="en-US" smtClean="0"/>
               <a:t>Edit Master text styles</a:t>
             </a:r>
           </a:p>
           <a:p>
             <a:pPr lvl="1"/>
             <a:r>
-              <a:rPr lang="en-US"/>
+              <a:rPr lang="en-US" smtClean="0"/>
               <a:t>Second level</a:t>
             </a:r>
           </a:p>
           <a:p>
             <a:pPr lvl="2"/>
             <a:r>
-              <a:rPr lang="en-US"/>
+              <a:rPr lang="en-US" smtClean="0"/>
               <a:t>Third level</a:t>
             </a:r>
           </a:p>
           <a:p>
             <a:pPr lvl="3"/>
             <a:r>
-              <a:rPr lang="en-US"/>
+              <a:rPr lang="en-US" smtClean="0"/>
               <a:t>Fourth level</a:t>
             </a:r>
           </a:p>
           <a:p>
             <a:pPr lvl="4"/>
             <a:r>
-              <a:rPr lang="en-US"/>
+              <a:rPr lang="en-US" smtClean="0"/>
               <a:t>Fifth level</a:t>
             </a:r>
+            <a:endParaRPr lang="en-US"/>
           </a:p>
         </p:txBody>
       </p:sp>
@@ -2544,7 +2560,7 @@
           <a:p>
             <a:fld id="{EC415814-B94C-473C-AF69-EEF9B37A2DCE}" type="datetimeFigureOut">
               <a:rPr lang="en-US" smtClean="0"/>
-              <a:t>8/24/2018</a:t>
+              <a:t>7/29/2018</a:t>
             </a:fld>
             <a:endParaRPr lang="en-US"/>
           </a:p>
@@ -3034,7 +3050,7 @@
             <a:lstStyle/>
             <a:p>
               <a:r>
-                <a:rPr lang="en-US" sz="1200" dirty="0">
+                <a:rPr lang="en-US" sz="1200" dirty="0" smtClean="0">
                   <a:solidFill>
                     <a:prstClr val="white"/>
                   </a:solidFill>
@@ -3773,7 +3789,7 @@
               <a:lstStyle/>
               <a:p>
                 <a:r>
-                  <a:rPr lang="en-US" sz="1200" kern="0" dirty="0">
+                  <a:rPr lang="en-US" sz="1200" kern="0" dirty="0" smtClean="0">
                     <a:solidFill>
                       <a:prstClr val="black">
                         <a:lumMod val="75000"/>
@@ -3782,8 +3798,29 @@
                     </a:solidFill>
                     <a:latin typeface="Segoe UI"/>
                   </a:rPr>
-                  <a:t>http://www.wouldyourather.com</a:t>
+                  <a:t>http://</a:t>
                 </a:r>
+                <a:r>
+                  <a:rPr lang="en-US" sz="1200" kern="0" dirty="0" smtClean="0">
+                    <a:solidFill>
+                      <a:prstClr val="black">
+                        <a:lumMod val="75000"/>
+                        <a:lumOff val="25000"/>
+                      </a:prstClr>
+                    </a:solidFill>
+                    <a:latin typeface="Segoe UI"/>
+                  </a:rPr>
+                  <a:t>www.wouldyourather.com</a:t>
+                </a:r>
+                <a:endParaRPr lang="en-US" sz="1200" kern="0" dirty="0">
+                  <a:solidFill>
+                    <a:prstClr val="black">
+                      <a:lumMod val="75000"/>
+                      <a:lumOff val="25000"/>
+                    </a:prstClr>
+                  </a:solidFill>
+                  <a:latin typeface="Segoe UI"/>
+                </a:endParaRPr>
               </a:p>
             </p:txBody>
           </p:sp>
@@ -4085,15 +4122,15 @@
           <a:lstStyle/>
           <a:p>
             <a:r>
-              <a:rPr lang="fi-FI" sz="3200" b="1" dirty="0" err="1"/>
+              <a:rPr lang="fi-FI" sz="3200" b="1" dirty="0" err="1" smtClean="0"/>
               <a:t>Recent</a:t>
             </a:r>
             <a:r>
-              <a:rPr lang="fi-FI" sz="3200" b="1" dirty="0"/>
+              <a:rPr lang="fi-FI" sz="3200" b="1" dirty="0" smtClean="0"/>
               <a:t> </a:t>
             </a:r>
             <a:r>
-              <a:rPr lang="fi-FI" sz="3200" b="1" dirty="0" err="1"/>
+              <a:rPr lang="fi-FI" sz="3200" b="1" dirty="0" err="1" smtClean="0"/>
               <a:t>Polls</a:t>
             </a:r>
             <a:endParaRPr lang="en-US" sz="2400" b="1" dirty="0"/>
@@ -4137,7 +4174,7 @@
             <a:lstStyle/>
             <a:p>
               <a:r>
-                <a:rPr lang="fi-FI" sz="1600" dirty="0" err="1">
+                <a:rPr lang="fi-FI" sz="1600" dirty="0" err="1" smtClean="0">
                   <a:ea typeface="Segoe UI" pitchFamily="34" charset="0"/>
                   <a:cs typeface="Segoe UI" pitchFamily="34" charset="0"/>
                 </a:rPr>
@@ -4302,12 +4339,16 @@
             <a:lstStyle/>
             <a:p>
               <a:r>
-                <a:rPr lang="en-US" sz="1600" dirty="0">
+                <a:rPr lang="en-US" sz="1600" dirty="0" smtClean="0">
                   <a:ea typeface="Segoe UI" pitchFamily="34" charset="0"/>
                   <a:cs typeface="Segoe UI" pitchFamily="34" charset="0"/>
                 </a:rPr>
                 <a:t>Answered</a:t>
               </a:r>
+              <a:endParaRPr lang="en-US" sz="1600" dirty="0">
+                <a:ea typeface="Segoe UI" pitchFamily="34" charset="0"/>
+                <a:cs typeface="Segoe UI" pitchFamily="34" charset="0"/>
+              </a:endParaRPr>
             </a:p>
           </p:txBody>
         </p:sp>
@@ -4386,15 +4427,15 @@
           <a:lstStyle/>
           <a:p>
             <a:r>
-              <a:rPr lang="fi-FI" sz="1600" dirty="0"/>
+              <a:rPr lang="fi-FI" sz="1600" dirty="0" smtClean="0"/>
               <a:t>Show </a:t>
             </a:r>
             <a:r>
-              <a:rPr lang="fi-FI" sz="1600" dirty="0" err="1"/>
+              <a:rPr lang="fi-FI" sz="1600" dirty="0" err="1" smtClean="0"/>
               <a:t>only</a:t>
             </a:r>
             <a:r>
-              <a:rPr lang="fi-FI" sz="1600" dirty="0"/>
+              <a:rPr lang="fi-FI" sz="1600" dirty="0" smtClean="0"/>
               <a:t>:</a:t>
             </a:r>
             <a:endParaRPr lang="en-US" sz="1600" dirty="0"/>
@@ -4441,7 +4482,7 @@
                     <a:lstStyle/>
                     <a:p>
                       <a:r>
-                        <a:rPr lang="fi-FI" sz="2800" u="sng" dirty="0">
+                        <a:rPr lang="fi-FI" sz="2800" u="sng" dirty="0" smtClean="0">
                           <a:hlinkClick r:id="rId9" invalidUrl="http:///"/>
                         </a:rPr>
                         <a:t>Mac VS PC?</a:t>
@@ -4481,24 +4522,24 @@
                         <a:defRPr/>
                       </a:pPr>
                       <a:r>
-                        <a:rPr lang="fi-FI" sz="2800" u="sng" dirty="0">
+                        <a:rPr lang="fi-FI" sz="2800" u="sng" dirty="0" smtClean="0">
                           <a:hlinkClick r:id="rId10" invalidUrl="http:///"/>
                         </a:rPr>
                         <a:t>iOS</a:t>
                       </a:r>
                       <a:r>
-                        <a:rPr lang="fi-FI" sz="2800" u="sng" baseline="0" dirty="0">
+                        <a:rPr lang="fi-FI" sz="2800" u="sng" baseline="0" dirty="0" smtClean="0">
                           <a:hlinkClick r:id="rId11" invalidUrl="http:///"/>
                         </a:rPr>
                         <a:t> VS Android</a:t>
                       </a:r>
                       <a:r>
-                        <a:rPr lang="fi-FI" sz="2800" u="sng" dirty="0">
+                        <a:rPr lang="fi-FI" sz="2800" u="sng" dirty="0" smtClean="0">
                           <a:hlinkClick r:id="rId12" invalidUrl="http:///"/>
                         </a:rPr>
                         <a:t>?</a:t>
                       </a:r>
-                      <a:endParaRPr lang="en-US" sz="2800" u="sng" dirty="0"/>
+                      <a:endParaRPr lang="en-US" sz="2800" u="sng" dirty="0" smtClean="0"/>
                     </a:p>
                   </a:txBody>
                   <a:tcPr/>
@@ -4533,36 +4574,36 @@
                         <a:defRPr/>
                       </a:pPr>
                       <a:r>
-                        <a:rPr lang="fi-FI" sz="2800" u="sng" dirty="0">
+                        <a:rPr lang="fi-FI" sz="2800" u="sng" dirty="0" smtClean="0">
                           <a:hlinkClick r:id="rId13" invalidUrl="http:///"/>
                         </a:rPr>
                         <a:t>Life </a:t>
                       </a:r>
                       <a:r>
-                        <a:rPr lang="fi-FI" sz="2800" u="sng" dirty="0" err="1">
+                        <a:rPr lang="fi-FI" sz="2800" u="sng" dirty="0" err="1" smtClean="0">
                           <a:hlinkClick r:id="rId14" invalidUrl="http:///"/>
                         </a:rPr>
                         <a:t>vs</a:t>
                       </a:r>
                       <a:r>
-                        <a:rPr lang="fi-FI" sz="2800" u="sng" dirty="0">
+                        <a:rPr lang="fi-FI" sz="2800" u="sng" dirty="0" smtClean="0">
                           <a:hlinkClick r:id="rId15" invalidUrl="http:///"/>
                         </a:rPr>
                         <a:t> </a:t>
                       </a:r>
                       <a:r>
-                        <a:rPr lang="fi-FI" sz="2800" u="sng" dirty="0" err="1">
+                        <a:rPr lang="fi-FI" sz="2800" u="sng" dirty="0" err="1" smtClean="0">
                           <a:hlinkClick r:id="rId16" invalidUrl="http:///"/>
                         </a:rPr>
                         <a:t>Death</a:t>
                       </a:r>
                       <a:r>
-                        <a:rPr lang="fi-FI" sz="2800" u="sng" dirty="0">
+                        <a:rPr lang="fi-FI" sz="2800" u="sng" dirty="0" smtClean="0">
                           <a:hlinkClick r:id="rId17" invalidUrl="http:///"/>
                         </a:rPr>
                         <a:t>?</a:t>
                       </a:r>
-                      <a:endParaRPr lang="en-US" sz="2800" u="sng" dirty="0"/>
+                      <a:endParaRPr lang="en-US" sz="2800" u="sng" dirty="0" smtClean="0"/>
                     </a:p>
                   </a:txBody>
                   <a:tcPr/>
@@ -4620,7 +4661,7 @@
           <a:p>
             <a:pPr algn="ctr"/>
             <a:r>
-              <a:rPr lang="fi-FI" b="1" dirty="0">
+              <a:rPr lang="fi-FI" b="1" dirty="0" smtClean="0">
                 <a:solidFill>
                   <a:schemeClr val="tx1"/>
                 </a:solidFill>
@@ -4658,7 +4699,7 @@
           <a:lstStyle/>
           <a:p>
             <a:r>
-              <a:rPr lang="fi-FI" dirty="0">
+              <a:rPr lang="fi-FI" dirty="0" smtClean="0">
                 <a:solidFill>
                   <a:schemeClr val="bg1"/>
                 </a:solidFill>
@@ -4763,15 +4804,15 @@
           <a:p>
             <a:pPr algn="ctr"/>
             <a:r>
-              <a:rPr lang="fi-FI" b="1" dirty="0" err="1"/>
+              <a:rPr lang="fi-FI" b="1" dirty="0" err="1" smtClean="0"/>
               <a:t>Create</a:t>
             </a:r>
             <a:r>
-              <a:rPr lang="fi-FI" b="1" dirty="0"/>
+              <a:rPr lang="fi-FI" b="1" dirty="0" smtClean="0"/>
               <a:t> </a:t>
             </a:r>
             <a:r>
-              <a:rPr lang="fi-FI" b="1" dirty="0" err="1"/>
+              <a:rPr lang="fi-FI" b="1" dirty="0" err="1" smtClean="0"/>
               <a:t>Poll</a:t>
             </a:r>
             <a:endParaRPr lang="en-US" b="1" dirty="0"/>
@@ -4801,7 +4842,7 @@
           <a:lstStyle/>
           <a:p>
             <a:r>
-              <a:rPr lang="fi-FI" b="1" dirty="0"/>
+              <a:rPr lang="fi-FI" b="1" dirty="0" smtClean="0"/>
               <a:t>HOME</a:t>
             </a:r>
             <a:endParaRPr lang="en-US" b="1" dirty="0"/>
@@ -4831,7 +4872,7 @@
           <a:lstStyle/>
           <a:p>
             <a:r>
-              <a:rPr lang="fi-FI" dirty="0">
+              <a:rPr lang="fi-FI" dirty="0" smtClean="0">
                 <a:solidFill>
                   <a:schemeClr val="bg1"/>
                 </a:solidFill>
@@ -4839,7 +4880,7 @@
               <a:t>Hi, </a:t>
             </a:r>
             <a:r>
-              <a:rPr lang="fi-FI" b="1" dirty="0">
+              <a:rPr lang="fi-FI" b="1" dirty="0" smtClean="0">
                 <a:solidFill>
                   <a:schemeClr val="bg1"/>
                 </a:solidFill>
@@ -4849,7 +4890,7 @@
           </a:p>
           <a:p>
             <a:r>
-              <a:rPr lang="fi-FI" u="sng" dirty="0" err="1">
+              <a:rPr lang="fi-FI" u="sng" dirty="0" err="1" smtClean="0">
                 <a:solidFill>
                   <a:srgbClr val="00B0F0"/>
                 </a:solidFill>
@@ -4913,6 +4954,13 @@
   <p:clrMapOvr>
     <a:masterClrMapping/>
   </p:clrMapOvr>
+  <p:timing>
+    <p:tnLst>
+      <p:par>
+        <p:cTn id="1" dur="indefinite" restart="never" nodeType="tmRoot"/>
+      </p:par>
+    </p:tnLst>
+  </p:timing>
 </p:sld>
 </file>
 
@@ -5018,7 +5066,7 @@
             <a:lstStyle/>
             <a:p>
               <a:r>
-                <a:rPr lang="en-US" sz="1200" dirty="0">
+                <a:rPr lang="en-US" sz="1200" dirty="0" smtClean="0">
                   <a:solidFill>
                     <a:prstClr val="white"/>
                   </a:solidFill>
@@ -5757,7 +5805,7 @@
               <a:lstStyle/>
               <a:p>
                 <a:r>
-                  <a:rPr lang="en-US" sz="1200" kern="0" dirty="0">
+                  <a:rPr lang="en-US" sz="1200" kern="0" dirty="0" smtClean="0">
                     <a:solidFill>
                       <a:prstClr val="black">
                         <a:lumMod val="75000"/>
@@ -5766,8 +5814,29 @@
                     </a:solidFill>
                     <a:latin typeface="Segoe UI"/>
                   </a:rPr>
-                  <a:t>http://www.wouldyourather.com</a:t>
+                  <a:t>http://</a:t>
                 </a:r>
+                <a:r>
+                  <a:rPr lang="en-US" sz="1200" kern="0" dirty="0" smtClean="0">
+                    <a:solidFill>
+                      <a:prstClr val="black">
+                        <a:lumMod val="75000"/>
+                        <a:lumOff val="25000"/>
+                      </a:prstClr>
+                    </a:solidFill>
+                    <a:latin typeface="Segoe UI"/>
+                  </a:rPr>
+                  <a:t>www.wouldyourather.com</a:t>
+                </a:r>
+                <a:endParaRPr lang="en-US" sz="1200" kern="0" dirty="0">
+                  <a:solidFill>
+                    <a:prstClr val="black">
+                      <a:lumMod val="75000"/>
+                      <a:lumOff val="25000"/>
+                    </a:prstClr>
+                  </a:solidFill>
+                  <a:latin typeface="Segoe UI"/>
+                </a:endParaRPr>
               </a:p>
             </p:txBody>
           </p:sp>
@@ -6069,7 +6138,7 @@
           <a:lstStyle/>
           <a:p>
             <a:r>
-              <a:rPr lang="fi-FI" sz="3200" b="1" dirty="0" err="1"/>
+              <a:rPr lang="fi-FI" sz="3200" b="1" dirty="0" err="1" smtClean="0"/>
               <a:t>Leaderboard</a:t>
             </a:r>
             <a:endParaRPr lang="en-US" sz="2400" b="1" dirty="0"/>
@@ -6119,7 +6188,7 @@
           <a:p>
             <a:pPr algn="ctr"/>
             <a:r>
-              <a:rPr lang="fi-FI" b="1" dirty="0">
+              <a:rPr lang="fi-FI" b="1" dirty="0" smtClean="0">
                 <a:solidFill>
                   <a:schemeClr val="tx1"/>
                 </a:solidFill>
@@ -6207,7 +6276,7 @@
           <a:lstStyle/>
           <a:p>
             <a:r>
-              <a:rPr lang="fi-FI" b="1" dirty="0"/>
+              <a:rPr lang="fi-FI" b="1" dirty="0" smtClean="0"/>
               <a:t>LEADERBOARD</a:t>
             </a:r>
             <a:endParaRPr lang="en-US" b="1" dirty="0"/>
@@ -6237,7 +6306,7 @@
           <a:lstStyle/>
           <a:p>
             <a:r>
-              <a:rPr lang="fi-FI" dirty="0">
+              <a:rPr lang="fi-FI" dirty="0" smtClean="0">
                 <a:solidFill>
                   <a:schemeClr val="bg1"/>
                 </a:solidFill>
@@ -6275,7 +6344,7 @@
           <a:lstStyle/>
           <a:p>
             <a:r>
-              <a:rPr lang="fi-FI" dirty="0">
+              <a:rPr lang="fi-FI" dirty="0" smtClean="0">
                 <a:solidFill>
                   <a:schemeClr val="bg1"/>
                 </a:solidFill>
@@ -6283,7 +6352,7 @@
               <a:t>Hi, </a:t>
             </a:r>
             <a:r>
-              <a:rPr lang="fi-FI" b="1" dirty="0">
+              <a:rPr lang="fi-FI" b="1" dirty="0" smtClean="0">
                 <a:solidFill>
                   <a:schemeClr val="bg1"/>
                 </a:solidFill>
@@ -6293,7 +6362,7 @@
           </a:p>
           <a:p>
             <a:r>
-              <a:rPr lang="fi-FI" u="sng" dirty="0" err="1">
+              <a:rPr lang="fi-FI" u="sng" dirty="0" err="1" smtClean="0">
                 <a:solidFill>
                   <a:srgbClr val="00B0F0"/>
                 </a:solidFill>
@@ -6457,7 +6526,7 @@
                     <a:lstStyle/>
                     <a:p>
                       <a:r>
-                        <a:rPr lang="fi-FI" sz="2000" b="1" i="0" dirty="0" err="1">
+                        <a:rPr lang="fi-FI" sz="2000" b="1" i="0" dirty="0" err="1" smtClean="0">
                           <a:solidFill>
                             <a:schemeClr val="tx1"/>
                           </a:solidFill>
@@ -6479,7 +6548,7 @@
                     <a:lstStyle/>
                     <a:p>
                       <a:r>
-                        <a:rPr lang="fi-FI" sz="2000" b="1" i="0" dirty="0" err="1">
+                        <a:rPr lang="fi-FI" sz="2000" b="1" i="0" dirty="0" err="1" smtClean="0">
                           <a:solidFill>
                             <a:schemeClr val="tx1"/>
                           </a:solidFill>
@@ -6509,7 +6578,7 @@
                     <a:p>
                       <a:pPr algn="ctr"/>
                       <a:r>
-                        <a:rPr lang="fi-FI" sz="2800" b="1" dirty="0"/>
+                        <a:rPr lang="fi-FI" sz="2800" b="1" dirty="0" smtClean="0"/>
                         <a:t>1</a:t>
                       </a:r>
                       <a:endParaRPr lang="en-US" sz="2800" b="1" dirty="0"/>
@@ -6533,11 +6602,11 @@
                     <a:lstStyle/>
                     <a:p>
                       <a:r>
-                        <a:rPr lang="fi-FI" sz="2800" b="0" dirty="0"/>
+                        <a:rPr lang="fi-FI" sz="2800" b="0" dirty="0" smtClean="0"/>
                         <a:t>Otto</a:t>
                       </a:r>
                       <a:r>
-                        <a:rPr lang="fi-FI" sz="2800" dirty="0"/>
+                        <a:rPr lang="fi-FI" sz="2800" dirty="0" smtClean="0"/>
                         <a:t> </a:t>
                       </a:r>
                       <a:endParaRPr lang="en-US" sz="2800" dirty="0"/>
@@ -6551,7 +6620,7 @@
                     <a:lstStyle/>
                     <a:p>
                       <a:r>
-                        <a:rPr lang="fi-FI" sz="2800" dirty="0"/>
+                        <a:rPr lang="fi-FI" sz="2800" dirty="0" smtClean="0"/>
                         <a:t>42</a:t>
                       </a:r>
                       <a:endParaRPr lang="en-US" sz="2800" dirty="0"/>
@@ -6565,7 +6634,7 @@
                     <a:lstStyle/>
                     <a:p>
                       <a:r>
-                        <a:rPr lang="fi-FI" sz="2800" dirty="0"/>
+                        <a:rPr lang="fi-FI" sz="2800" dirty="0" smtClean="0"/>
                         <a:t>11</a:t>
                       </a:r>
                       <a:endParaRPr lang="en-US" sz="2800" dirty="0"/>
@@ -6587,7 +6656,7 @@
                     <a:p>
                       <a:pPr algn="ctr"/>
                       <a:r>
-                        <a:rPr lang="fi-FI" sz="2800" b="1" dirty="0"/>
+                        <a:rPr lang="fi-FI" sz="2800" b="1" dirty="0" smtClean="0"/>
                         <a:t>2</a:t>
                       </a:r>
                       <a:endParaRPr lang="en-US" sz="2800" b="1" dirty="0"/>
@@ -6611,11 +6680,11 @@
                     <a:lstStyle/>
                     <a:p>
                       <a:r>
-                        <a:rPr lang="fi-FI" sz="2800" b="0" dirty="0"/>
+                        <a:rPr lang="fi-FI" sz="2800" b="0" dirty="0" smtClean="0"/>
                         <a:t>Jamppa</a:t>
                       </a:r>
                       <a:r>
-                        <a:rPr lang="fi-FI" sz="2800" dirty="0"/>
+                        <a:rPr lang="fi-FI" sz="2800" dirty="0" smtClean="0"/>
                         <a:t> </a:t>
                       </a:r>
                       <a:endParaRPr lang="en-US" sz="2800" dirty="0"/>
@@ -6629,7 +6698,7 @@
                     <a:lstStyle/>
                     <a:p>
                       <a:r>
-                        <a:rPr lang="fi-FI" sz="2800" dirty="0"/>
+                        <a:rPr lang="fi-FI" sz="2800" dirty="0" smtClean="0"/>
                         <a:t>22</a:t>
                       </a:r>
                       <a:endParaRPr lang="en-US" sz="2800" dirty="0"/>
@@ -6643,7 +6712,7 @@
                     <a:lstStyle/>
                     <a:p>
                       <a:r>
-                        <a:rPr lang="fi-FI" sz="2800" dirty="0"/>
+                        <a:rPr lang="fi-FI" sz="2800" dirty="0" smtClean="0"/>
                         <a:t>12</a:t>
                       </a:r>
                       <a:endParaRPr lang="en-US" sz="2800" dirty="0"/>
@@ -6665,7 +6734,7 @@
                     <a:p>
                       <a:pPr algn="ctr"/>
                       <a:r>
-                        <a:rPr lang="fi-FI" sz="2800" b="1" dirty="0"/>
+                        <a:rPr lang="fi-FI" sz="2800" b="1" dirty="0" smtClean="0"/>
                         <a:t>3</a:t>
                       </a:r>
                       <a:endParaRPr lang="en-US" sz="2800" b="1" dirty="0"/>
@@ -6689,7 +6758,7 @@
                     <a:lstStyle/>
                     <a:p>
                       <a:r>
-                        <a:rPr lang="fi-FI" sz="2800" b="0" dirty="0"/>
+                        <a:rPr lang="fi-FI" sz="2800" b="0" dirty="0" smtClean="0"/>
                         <a:t>Joku</a:t>
                       </a:r>
                       <a:endParaRPr lang="en-US" sz="2800" dirty="0"/>
@@ -6703,7 +6772,7 @@
                     <a:lstStyle/>
                     <a:p>
                       <a:r>
-                        <a:rPr lang="fi-FI" sz="2800" dirty="0"/>
+                        <a:rPr lang="fi-FI" sz="2800" dirty="0" smtClean="0"/>
                         <a:t>11</a:t>
                       </a:r>
                       <a:endParaRPr lang="en-US" sz="2800" dirty="0"/>
@@ -6717,7 +6786,7 @@
                     <a:lstStyle/>
                     <a:p>
                       <a:r>
-                        <a:rPr lang="fi-FI" sz="2800" dirty="0"/>
+                        <a:rPr lang="fi-FI" sz="2800" dirty="0" smtClean="0"/>
                         <a:t>5</a:t>
                       </a:r>
                       <a:endParaRPr lang="en-US" sz="2800" dirty="0"/>
@@ -6862,6 +6931,13 @@
   <p:clrMapOvr>
     <a:masterClrMapping/>
   </p:clrMapOvr>
+  <p:timing>
+    <p:tnLst>
+      <p:par>
+        <p:cTn id="1" dur="indefinite" restart="never" nodeType="tmRoot"/>
+      </p:par>
+    </p:tnLst>
+  </p:timing>
 </p:sld>
 </file>
 
@@ -7128,19 +7204,19 @@
 
 <file path=customXml/item1.xml><?xml version="1.0" encoding="utf-8"?>
 <Control xmlns="http://schemas.microsoft.com/VisualStudio/2011/storyboarding/control">
-  <Id Name="System.Storyboarding.Common.RadioButtonSelected" Revision="1" Stencil="System.Storyboarding.Common" StencilVersion="0.1"/>
+  <Id Name="System.Storyboarding.Backgrounds.WebBrowser" Revision="1" Stencil="System.Storyboarding.Backgrounds" StencilVersion="0.1"/>
 </Control>
 </file>
 
 <file path=customXml/item2.xml><?xml version="1.0" encoding="utf-8"?>
 <Control xmlns="http://schemas.microsoft.com/VisualStudio/2011/storyboarding/control">
-  <Id Name="System.Storyboarding.Backgrounds.WebBrowser" Revision="1" Stencil="System.Storyboarding.Backgrounds" StencilVersion="0.1"/>
+  <Id Name="System.Storyboarding.Common.RadioButtonSelected" Revision="1" Stencil="System.Storyboarding.Common" StencilVersion="0.1"/>
 </Control>
 </file>
 
 <file path=customXml/item3.xml><?xml version="1.0" encoding="utf-8"?>
 <Control xmlns="http://schemas.microsoft.com/VisualStudio/2011/storyboarding/control">
-  <Id Name="System.Storyboarding.Backgrounds.WebBrowser" Revision="1" Stencil="System.Storyboarding.Backgrounds" StencilVersion="0.1"/>
+  <Id Name="System.Storyboarding.Common.RadioButtonUnselected" Revision="1" Stencil="System.Storyboarding.Common" StencilVersion="0.1"/>
 </Control>
 </file>
 
@@ -7152,11 +7228,19 @@
 
 <file path=customXml/item5.xml><?xml version="1.0" encoding="utf-8"?>
 <Control xmlns="http://schemas.microsoft.com/VisualStudio/2011/storyboarding/control">
-  <Id Name="System.Storyboarding.Common.RadioButtonUnselected" Revision="1" Stencil="System.Storyboarding.Common" StencilVersion="0.1"/>
+  <Id Name="System.Storyboarding.Backgrounds.WebBrowser" Revision="1" Stencil="System.Storyboarding.Backgrounds" StencilVersion="0.1"/>
 </Control>
 </file>
 
 <file path=customXml/itemProps1.xml><?xml version="1.0" encoding="utf-8"?>
+<ds:datastoreItem xmlns:ds="http://schemas.openxmlformats.org/officeDocument/2006/customXml" ds:itemID="{281A391A-97E2-4749-A0A9-66BFA62F6FF3}">
+  <ds:schemaRefs>
+    <ds:schemaRef ds:uri="http://schemas.microsoft.com/VisualStudio/2011/storyboarding/control"/>
+  </ds:schemaRefs>
+</ds:datastoreItem>
+</file>
+
+<file path=customXml/itemProps2.xml><?xml version="1.0" encoding="utf-8"?>
 <ds:datastoreItem xmlns:ds="http://schemas.openxmlformats.org/officeDocument/2006/customXml" ds:itemID="{D0E6584B-717D-4514-9F22-FB3540F169E4}">
   <ds:schemaRefs>
     <ds:schemaRef ds:uri="http://schemas.microsoft.com/VisualStudio/2011/storyboarding/control"/>
@@ -7164,16 +7248,8 @@
 </ds:datastoreItem>
 </file>
 
-<file path=customXml/itemProps2.xml><?xml version="1.0" encoding="utf-8"?>
-<ds:datastoreItem xmlns:ds="http://schemas.openxmlformats.org/officeDocument/2006/customXml" ds:itemID="{281A391A-97E2-4749-A0A9-66BFA62F6FF3}">
-  <ds:schemaRefs>
-    <ds:schemaRef ds:uri="http://schemas.microsoft.com/VisualStudio/2011/storyboarding/control"/>
-  </ds:schemaRefs>
-</ds:datastoreItem>
-</file>
-
 <file path=customXml/itemProps3.xml><?xml version="1.0" encoding="utf-8"?>
-<ds:datastoreItem xmlns:ds="http://schemas.openxmlformats.org/officeDocument/2006/customXml" ds:itemID="{855C0946-8D23-49D1-A6A1-613185B33159}">
+<ds:datastoreItem xmlns:ds="http://schemas.openxmlformats.org/officeDocument/2006/customXml" ds:itemID="{B446E4FF-BE85-4D9A-B093-D1C5C8561538}">
   <ds:schemaRefs>
     <ds:schemaRef ds:uri="http://schemas.microsoft.com/VisualStudio/2011/storyboarding/control"/>
   </ds:schemaRefs>
@@ -7189,7 +7265,7 @@
 </file>
 
 <file path=customXml/itemProps5.xml><?xml version="1.0" encoding="utf-8"?>
-<ds:datastoreItem xmlns:ds="http://schemas.openxmlformats.org/officeDocument/2006/customXml" ds:itemID="{B446E4FF-BE85-4D9A-B093-D1C5C8561538}">
+<ds:datastoreItem xmlns:ds="http://schemas.openxmlformats.org/officeDocument/2006/customXml" ds:itemID="{855C0946-8D23-49D1-A6A1-613185B33159}">
   <ds:schemaRefs>
     <ds:schemaRef ds:uri="http://schemas.microsoft.com/VisualStudio/2011/storyboarding/control"/>
   </ds:schemaRefs>

</xml_diff>